<commit_message>
review report & presentation
</commit_message>
<xml_diff>
--- a/doc/presentation.pptx
+++ b/doc/presentation.pptx
@@ -256,7 +256,7 @@
               <a:pPr>
                 <a:defRPr/>
               </a:pPr>
-              <a:t>25.06.2017</a:t>
+              <a:t>27.06.2017</a:t>
             </a:fld>
             <a:endParaRPr lang="de-CH"/>
           </a:p>
@@ -564,6 +564,96 @@
 </p:notesMaster>
 </file>
 
+<file path=ppt/notesSlides/notesSlide1.xml><?xml version="1.0" encoding="utf-8"?>
+<p:notes xmlns:a="http://schemas.openxmlformats.org/drawingml/2006/main" xmlns:r="http://schemas.openxmlformats.org/officeDocument/2006/relationships" xmlns:p="http://schemas.openxmlformats.org/presentationml/2006/main">
+  <p:cSld>
+    <p:spTree>
+      <p:nvGrpSpPr>
+        <p:cNvPr id="1" name=""/>
+        <p:cNvGrpSpPr/>
+        <p:nvPr/>
+      </p:nvGrpSpPr>
+      <p:grpSpPr>
+        <a:xfrm>
+          <a:off x="0" y="0"/>
+          <a:ext cx="0" cy="0"/>
+          <a:chOff x="0" y="0"/>
+          <a:chExt cx="0" cy="0"/>
+        </a:xfrm>
+      </p:grpSpPr>
+      <p:sp>
+        <p:nvSpPr>
+          <p:cNvPr id="2" name="Slide Image Placeholder 1"/>
+          <p:cNvSpPr>
+            <a:spLocks noGrp="1" noRot="1" noChangeAspect="1"/>
+          </p:cNvSpPr>
+          <p:nvPr>
+            <p:ph type="sldImg"/>
+          </p:nvPr>
+        </p:nvSpPr>
+        <p:spPr/>
+      </p:sp>
+      <p:sp>
+        <p:nvSpPr>
+          <p:cNvPr id="3" name="Notes Placeholder 2"/>
+          <p:cNvSpPr>
+            <a:spLocks noGrp="1"/>
+          </p:cNvSpPr>
+          <p:nvPr>
+            <p:ph type="body" idx="1"/>
+          </p:nvPr>
+        </p:nvSpPr>
+        <p:spPr/>
+        <p:txBody>
+          <a:bodyPr/>
+          <a:lstStyle/>
+          <a:p>
+            <a:endParaRPr lang="en-GB" dirty="0"/>
+          </a:p>
+        </p:txBody>
+      </p:sp>
+      <p:sp>
+        <p:nvSpPr>
+          <p:cNvPr id="4" name="Slide Number Placeholder 3"/>
+          <p:cNvSpPr>
+            <a:spLocks noGrp="1"/>
+          </p:cNvSpPr>
+          <p:nvPr>
+            <p:ph type="sldNum" sz="quarter" idx="10"/>
+          </p:nvPr>
+        </p:nvSpPr>
+        <p:spPr/>
+        <p:txBody>
+          <a:bodyPr/>
+          <a:lstStyle/>
+          <a:p>
+            <a:pPr>
+              <a:defRPr/>
+            </a:pPr>
+            <a:fld id="{EE3A4D74-8AB3-4782-8193-8B0B8D7F57EA}" type="slidenum">
+              <a:rPr lang="de-CH" smtClean="0"/>
+              <a:pPr>
+                <a:defRPr/>
+              </a:pPr>
+              <a:t>10</a:t>
+            </a:fld>
+            <a:endParaRPr lang="de-CH"/>
+          </a:p>
+        </p:txBody>
+      </p:sp>
+    </p:spTree>
+    <p:extLst>
+      <p:ext uri="{BB962C8B-B14F-4D97-AF65-F5344CB8AC3E}">
+        <p14:creationId xmlns:p14="http://schemas.microsoft.com/office/powerpoint/2010/main" val="2942042289"/>
+      </p:ext>
+    </p:extLst>
+  </p:cSld>
+  <p:clrMapOvr>
+    <a:masterClrMapping/>
+  </p:clrMapOvr>
+</p:notes>
+</file>
+
 <file path=ppt/slideLayouts/slideLayout1.xml><?xml version="1.0" encoding="utf-8"?>
 <p:sldLayout xmlns:a="http://schemas.openxmlformats.org/drawingml/2006/main" xmlns:r="http://schemas.openxmlformats.org/officeDocument/2006/relationships" xmlns:p="http://schemas.openxmlformats.org/presentationml/2006/main" preserve="1" userDrawn="1">
   <p:cSld name="Titelfolie mit Bild">
@@ -1187,7 +1277,7 @@
               <a:pPr>
                 <a:defRPr/>
               </a:pPr>
-              <a:t>25.06.2017</a:t>
+              <a:t>27.06.2017</a:t>
             </a:fld>
             <a:r>
               <a:rPr lang="de-DE" sz="1000"/>
@@ -2625,7 +2715,7 @@
               <a:pPr>
                 <a:defRPr/>
               </a:pPr>
-              <a:t>25.06.2017</a:t>
+              <a:t>27.06.2017</a:t>
             </a:fld>
             <a:r>
               <a:rPr lang="de-DE" sz="1000"/>
@@ -6742,7 +6832,7 @@
             </a:r>
             <a:r>
               <a:rPr lang="en-GB" dirty="0" err="1"/>
-              <a:t>PoC</a:t>
+              <a:t>PoCs</a:t>
             </a:r>
             <a:endParaRPr lang="en-GB" dirty="0"/>
           </a:p>
@@ -6790,13 +6880,8 @@
             <a:pPr lvl="1"/>
             <a:r>
               <a:rPr lang="en-GB" dirty="0"/>
-              <a:t>Additional flash </a:t>
-            </a:r>
-            <a:r>
-              <a:rPr lang="en-GB"/>
-              <a:t>board available</a:t>
-            </a:r>
-            <a:endParaRPr lang="en-GB" dirty="0"/>
+              <a:t>Additional flash board available</a:t>
+            </a:r>
           </a:p>
           <a:p>
             <a:r>
@@ -7018,7 +7103,7 @@
           <a:p>
             <a:r>
               <a:rPr lang="en-GB" dirty="0"/>
-              <a:t>While connected to the network, a status is published as well</a:t>
+              <a:t>While connected to the network, a status is published as well.</a:t>
             </a:r>
           </a:p>
           <a:p>
@@ -7152,13 +7237,8 @@
           <a:p>
             <a:r>
               <a:rPr lang="en-GB" dirty="0"/>
-              <a:t>GPS &amp; WiFi libraries cannot be loaded </a:t>
-            </a:r>
-            <a:r>
-              <a:rPr lang="en-GB" dirty="0"/>
-              <a:t>simultaneously</a:t>
-            </a:r>
-            <a:endParaRPr lang="en-GB" dirty="0"/>
+              <a:t>GPS &amp; WiFi libraries cannot be loaded simultaneously</a:t>
+            </a:r>
           </a:p>
           <a:p>
             <a:r>
@@ -7781,7 +7861,6 @@
               <a:rPr lang="en-GB" dirty="0"/>
               <a:t>SIOT centre down</a:t>
             </a:r>
-            <a:endParaRPr lang="en-GB" dirty="0"/>
           </a:p>
         </p:txBody>
       </p:sp>

</xml_diff>